<commit_message>
Added Week 2 recap, minor update to Week 2 PPT, updates to main page
</commit_message>
<xml_diff>
--- a/Week-02/Week-02_IntroToFormulasAndFunctions.pptx
+++ b/Week-02/Week-02_IntroToFormulasAndFunctions.pptx
@@ -971,7 +971,7 @@
           <a:p>
             <a:fld id="{FD29A1BE-704B-408E-AC54-DB5007F9FC79}" type="datetimeFigureOut">
               <a:rPr lang="en-US" smtClean="0"/>
-              <a:t>7/17/2022</a:t>
+              <a:t>7/20/2022</a:t>
             </a:fld>
             <a:endParaRPr lang="en-US"/>
           </a:p>
@@ -1976,7 +1976,7 @@
           <a:p>
             <a:fld id="{2C6FF9A6-8E7D-412C-A4AD-F25884266C28}" type="datetimeFigureOut">
               <a:rPr lang="en-US" smtClean="0"/>
-              <a:t>7/17/2022</a:t>
+              <a:t>7/20/2022</a:t>
             </a:fld>
             <a:endParaRPr lang="en-US"/>
           </a:p>
@@ -2174,7 +2174,7 @@
           <a:p>
             <a:fld id="{2C6FF9A6-8E7D-412C-A4AD-F25884266C28}" type="datetimeFigureOut">
               <a:rPr lang="en-US" smtClean="0"/>
-              <a:t>7/17/2022</a:t>
+              <a:t>7/20/2022</a:t>
             </a:fld>
             <a:endParaRPr lang="en-US"/>
           </a:p>
@@ -2382,7 +2382,7 @@
           <a:p>
             <a:fld id="{2C6FF9A6-8E7D-412C-A4AD-F25884266C28}" type="datetimeFigureOut">
               <a:rPr lang="en-US" smtClean="0"/>
-              <a:t>7/17/2022</a:t>
+              <a:t>7/20/2022</a:t>
             </a:fld>
             <a:endParaRPr lang="en-US"/>
           </a:p>
@@ -2580,7 +2580,7 @@
           <a:p>
             <a:fld id="{2C6FF9A6-8E7D-412C-A4AD-F25884266C28}" type="datetimeFigureOut">
               <a:rPr lang="en-US" smtClean="0"/>
-              <a:t>7/17/2022</a:t>
+              <a:t>7/20/2022</a:t>
             </a:fld>
             <a:endParaRPr lang="en-US"/>
           </a:p>
@@ -2855,7 +2855,7 @@
           <a:p>
             <a:fld id="{2C6FF9A6-8E7D-412C-A4AD-F25884266C28}" type="datetimeFigureOut">
               <a:rPr lang="en-US" smtClean="0"/>
-              <a:t>7/17/2022</a:t>
+              <a:t>7/20/2022</a:t>
             </a:fld>
             <a:endParaRPr lang="en-US"/>
           </a:p>
@@ -3120,7 +3120,7 @@
           <a:p>
             <a:fld id="{2C6FF9A6-8E7D-412C-A4AD-F25884266C28}" type="datetimeFigureOut">
               <a:rPr lang="en-US" smtClean="0"/>
-              <a:t>7/17/2022</a:t>
+              <a:t>7/20/2022</a:t>
             </a:fld>
             <a:endParaRPr lang="en-US"/>
           </a:p>
@@ -3532,7 +3532,7 @@
           <a:p>
             <a:fld id="{2C6FF9A6-8E7D-412C-A4AD-F25884266C28}" type="datetimeFigureOut">
               <a:rPr lang="en-US" smtClean="0"/>
-              <a:t>7/17/2022</a:t>
+              <a:t>7/20/2022</a:t>
             </a:fld>
             <a:endParaRPr lang="en-US"/>
           </a:p>
@@ -3673,7 +3673,7 @@
           <a:p>
             <a:fld id="{2C6FF9A6-8E7D-412C-A4AD-F25884266C28}" type="datetimeFigureOut">
               <a:rPr lang="en-US" smtClean="0"/>
-              <a:t>7/17/2022</a:t>
+              <a:t>7/20/2022</a:t>
             </a:fld>
             <a:endParaRPr lang="en-US"/>
           </a:p>
@@ -3786,7 +3786,7 @@
           <a:p>
             <a:fld id="{2C6FF9A6-8E7D-412C-A4AD-F25884266C28}" type="datetimeFigureOut">
               <a:rPr lang="en-US" smtClean="0"/>
-              <a:t>7/17/2022</a:t>
+              <a:t>7/20/2022</a:t>
             </a:fld>
             <a:endParaRPr lang="en-US"/>
           </a:p>
@@ -4097,7 +4097,7 @@
           <a:p>
             <a:fld id="{2C6FF9A6-8E7D-412C-A4AD-F25884266C28}" type="datetimeFigureOut">
               <a:rPr lang="en-US" smtClean="0"/>
-              <a:t>7/17/2022</a:t>
+              <a:t>7/20/2022</a:t>
             </a:fld>
             <a:endParaRPr lang="en-US"/>
           </a:p>
@@ -4385,7 +4385,7 @@
           <a:p>
             <a:fld id="{2C6FF9A6-8E7D-412C-A4AD-F25884266C28}" type="datetimeFigureOut">
               <a:rPr lang="en-US" smtClean="0"/>
-              <a:t>7/17/2022</a:t>
+              <a:t>7/20/2022</a:t>
             </a:fld>
             <a:endParaRPr lang="en-US"/>
           </a:p>
@@ -4626,7 +4626,7 @@
           <a:p>
             <a:fld id="{2C6FF9A6-8E7D-412C-A4AD-F25884266C28}" type="datetimeFigureOut">
               <a:rPr lang="en-US" smtClean="0"/>
-              <a:t>7/17/2022</a:t>
+              <a:t>7/20/2022</a:t>
             </a:fld>
             <a:endParaRPr lang="en-US"/>
           </a:p>
@@ -6080,7 +6080,12 @@
             <p:ph idx="1"/>
           </p:nvPr>
         </p:nvSpPr>
-        <p:spPr/>
+        <p:spPr>
+          <a:xfrm>
+            <a:off x="838200" y="1825625"/>
+            <a:ext cx="10515600" cy="2657598"/>
+          </a:xfrm>
+        </p:spPr>
         <p:txBody>
           <a:bodyPr/>
           <a:lstStyle/>
@@ -6112,13 +6117,230 @@
             </a:r>
           </a:p>
           <a:p>
+            <a:pPr>
+              <a:buFontTx/>
+              <a:buChar char="-"/>
+            </a:pPr>
+            <a:r>
+              <a:rPr lang="en-US" dirty="0"/>
+              <a:t>Another worksheet</a:t>
+            </a:r>
+          </a:p>
+          <a:p>
             <a:pPr marL="0" indent="0">
               <a:buNone/>
             </a:pPr>
-            <a:r>
-              <a:rPr lang="en-US" dirty="0"/>
-              <a:t>- Another worksheet</a:t>
-            </a:r>
+            <a:endParaRPr lang="en-US" dirty="0"/>
+          </a:p>
+        </p:txBody>
+      </p:sp>
+      <p:sp>
+        <p:nvSpPr>
+          <p:cNvPr id="4" name="Content Placeholder 2">
+            <a:extLst>
+              <a:ext uri="{FF2B5EF4-FFF2-40B4-BE49-F238E27FC236}">
+                <a16:creationId xmlns:a16="http://schemas.microsoft.com/office/drawing/2014/main" id="{4EFE0DA0-514A-6564-B1FE-D4F8EE34E1EB}"/>
+              </a:ext>
+            </a:extLst>
+          </p:cNvPr>
+          <p:cNvSpPr txBox="1">
+            <a:spLocks/>
+          </p:cNvSpPr>
+          <p:nvPr/>
+        </p:nvSpPr>
+        <p:spPr>
+          <a:xfrm>
+            <a:off x="838200" y="5921406"/>
+            <a:ext cx="10515600" cy="407956"/>
+          </a:xfrm>
+          <a:prstGeom prst="rect">
+            <a:avLst/>
+          </a:prstGeom>
+        </p:spPr>
+        <p:txBody>
+          <a:bodyPr vert="horz" lIns="91440" tIns="45720" rIns="91440" bIns="45720" rtlCol="0">
+            <a:normAutofit/>
+          </a:bodyPr>
+          <a:lstStyle>
+            <a:lvl1pPr marL="228600" indent="-228600" algn="l" defTabSz="914400" rtl="0" eaLnBrk="1" latinLnBrk="0" hangingPunct="1">
+              <a:lnSpc>
+                <a:spcPct val="90000"/>
+              </a:lnSpc>
+              <a:spcBef>
+                <a:spcPts val="1000"/>
+              </a:spcBef>
+              <a:buFont typeface="Arial" panose="020B0604020202020204" pitchFamily="34" charset="0"/>
+              <a:buChar char="•"/>
+              <a:defRPr sz="2800" kern="1200">
+                <a:solidFill>
+                  <a:schemeClr val="tx1"/>
+                </a:solidFill>
+                <a:latin typeface="+mn-lt"/>
+                <a:ea typeface="+mn-ea"/>
+                <a:cs typeface="+mn-cs"/>
+              </a:defRPr>
+            </a:lvl1pPr>
+            <a:lvl2pPr marL="685800" indent="-228600" algn="l" defTabSz="914400" rtl="0" eaLnBrk="1" latinLnBrk="0" hangingPunct="1">
+              <a:lnSpc>
+                <a:spcPct val="90000"/>
+              </a:lnSpc>
+              <a:spcBef>
+                <a:spcPts val="500"/>
+              </a:spcBef>
+              <a:buFont typeface="Arial" panose="020B0604020202020204" pitchFamily="34" charset="0"/>
+              <a:buChar char="•"/>
+              <a:defRPr sz="2400" kern="1200">
+                <a:solidFill>
+                  <a:schemeClr val="tx1"/>
+                </a:solidFill>
+                <a:latin typeface="+mn-lt"/>
+                <a:ea typeface="+mn-ea"/>
+                <a:cs typeface="+mn-cs"/>
+              </a:defRPr>
+            </a:lvl2pPr>
+            <a:lvl3pPr marL="1143000" indent="-228600" algn="l" defTabSz="914400" rtl="0" eaLnBrk="1" latinLnBrk="0" hangingPunct="1">
+              <a:lnSpc>
+                <a:spcPct val="90000"/>
+              </a:lnSpc>
+              <a:spcBef>
+                <a:spcPts val="500"/>
+              </a:spcBef>
+              <a:buFont typeface="Arial" panose="020B0604020202020204" pitchFamily="34" charset="0"/>
+              <a:buChar char="•"/>
+              <a:defRPr sz="2000" kern="1200">
+                <a:solidFill>
+                  <a:schemeClr val="tx1"/>
+                </a:solidFill>
+                <a:latin typeface="+mn-lt"/>
+                <a:ea typeface="+mn-ea"/>
+                <a:cs typeface="+mn-cs"/>
+              </a:defRPr>
+            </a:lvl3pPr>
+            <a:lvl4pPr marL="1600200" indent="-228600" algn="l" defTabSz="914400" rtl="0" eaLnBrk="1" latinLnBrk="0" hangingPunct="1">
+              <a:lnSpc>
+                <a:spcPct val="90000"/>
+              </a:lnSpc>
+              <a:spcBef>
+                <a:spcPts val="500"/>
+              </a:spcBef>
+              <a:buFont typeface="Arial" panose="020B0604020202020204" pitchFamily="34" charset="0"/>
+              <a:buChar char="•"/>
+              <a:defRPr sz="1800" kern="1200">
+                <a:solidFill>
+                  <a:schemeClr val="tx1"/>
+                </a:solidFill>
+                <a:latin typeface="+mn-lt"/>
+                <a:ea typeface="+mn-ea"/>
+                <a:cs typeface="+mn-cs"/>
+              </a:defRPr>
+            </a:lvl4pPr>
+            <a:lvl5pPr marL="2057400" indent="-228600" algn="l" defTabSz="914400" rtl="0" eaLnBrk="1" latinLnBrk="0" hangingPunct="1">
+              <a:lnSpc>
+                <a:spcPct val="90000"/>
+              </a:lnSpc>
+              <a:spcBef>
+                <a:spcPts val="500"/>
+              </a:spcBef>
+              <a:buFont typeface="Arial" panose="020B0604020202020204" pitchFamily="34" charset="0"/>
+              <a:buChar char="•"/>
+              <a:defRPr sz="1800" kern="1200">
+                <a:solidFill>
+                  <a:schemeClr val="tx1"/>
+                </a:solidFill>
+                <a:latin typeface="+mn-lt"/>
+                <a:ea typeface="+mn-ea"/>
+                <a:cs typeface="+mn-cs"/>
+              </a:defRPr>
+            </a:lvl5pPr>
+            <a:lvl6pPr marL="2514600" indent="-228600" algn="l" defTabSz="914400" rtl="0" eaLnBrk="1" latinLnBrk="0" hangingPunct="1">
+              <a:lnSpc>
+                <a:spcPct val="90000"/>
+              </a:lnSpc>
+              <a:spcBef>
+                <a:spcPts val="500"/>
+              </a:spcBef>
+              <a:buFont typeface="Arial" panose="020B0604020202020204" pitchFamily="34" charset="0"/>
+              <a:buChar char="•"/>
+              <a:defRPr sz="1800" kern="1200">
+                <a:solidFill>
+                  <a:schemeClr val="tx1"/>
+                </a:solidFill>
+                <a:latin typeface="+mn-lt"/>
+                <a:ea typeface="+mn-ea"/>
+                <a:cs typeface="+mn-cs"/>
+              </a:defRPr>
+            </a:lvl6pPr>
+            <a:lvl7pPr marL="2971800" indent="-228600" algn="l" defTabSz="914400" rtl="0" eaLnBrk="1" latinLnBrk="0" hangingPunct="1">
+              <a:lnSpc>
+                <a:spcPct val="90000"/>
+              </a:lnSpc>
+              <a:spcBef>
+                <a:spcPts val="500"/>
+              </a:spcBef>
+              <a:buFont typeface="Arial" panose="020B0604020202020204" pitchFamily="34" charset="0"/>
+              <a:buChar char="•"/>
+              <a:defRPr sz="1800" kern="1200">
+                <a:solidFill>
+                  <a:schemeClr val="tx1"/>
+                </a:solidFill>
+                <a:latin typeface="+mn-lt"/>
+                <a:ea typeface="+mn-ea"/>
+                <a:cs typeface="+mn-cs"/>
+              </a:defRPr>
+            </a:lvl7pPr>
+            <a:lvl8pPr marL="3429000" indent="-228600" algn="l" defTabSz="914400" rtl="0" eaLnBrk="1" latinLnBrk="0" hangingPunct="1">
+              <a:lnSpc>
+                <a:spcPct val="90000"/>
+              </a:lnSpc>
+              <a:spcBef>
+                <a:spcPts val="500"/>
+              </a:spcBef>
+              <a:buFont typeface="Arial" panose="020B0604020202020204" pitchFamily="34" charset="0"/>
+              <a:buChar char="•"/>
+              <a:defRPr sz="1800" kern="1200">
+                <a:solidFill>
+                  <a:schemeClr val="tx1"/>
+                </a:solidFill>
+                <a:latin typeface="+mn-lt"/>
+                <a:ea typeface="+mn-ea"/>
+                <a:cs typeface="+mn-cs"/>
+              </a:defRPr>
+            </a:lvl8pPr>
+            <a:lvl9pPr marL="3886200" indent="-228600" algn="l" defTabSz="914400" rtl="0" eaLnBrk="1" latinLnBrk="0" hangingPunct="1">
+              <a:lnSpc>
+                <a:spcPct val="90000"/>
+              </a:lnSpc>
+              <a:spcBef>
+                <a:spcPts val="500"/>
+              </a:spcBef>
+              <a:buFont typeface="Arial" panose="020B0604020202020204" pitchFamily="34" charset="0"/>
+              <a:buChar char="•"/>
+              <a:defRPr sz="1800" kern="1200">
+                <a:solidFill>
+                  <a:schemeClr val="tx1"/>
+                </a:solidFill>
+                <a:latin typeface="+mn-lt"/>
+                <a:ea typeface="+mn-ea"/>
+                <a:cs typeface="+mn-cs"/>
+              </a:defRPr>
+            </a:lvl9pPr>
+          </a:lstStyle>
+          <a:p>
+            <a:pPr marL="0" indent="0">
+              <a:buFont typeface="Arial" panose="020B0604020202020204" pitchFamily="34" charset="0"/>
+              <a:buNone/>
+            </a:pPr>
+            <a:r>
+              <a:rPr lang="en-US" sz="2000" dirty="0"/>
+              <a:t>Learn more at UCLC: </a:t>
+            </a:r>
+            <a:r>
+              <a:rPr lang="en-US" sz="2000" dirty="0">
+                <a:hlinkClick r:id="rId3"/>
+              </a:rPr>
+              <a:t>Referencing data in Excel 365</a:t>
+            </a:r>
+            <a:endParaRPr lang="en-US" sz="2000" dirty="0"/>
           </a:p>
         </p:txBody>
       </p:sp>
@@ -7186,12 +7408,6 @@
 </file>
 
 <file path=customXml/item1.xml><?xml version="1.0" encoding="utf-8"?>
-<p:properties xmlns:p="http://schemas.microsoft.com/office/2006/metadata/properties" xmlns:xsi="http://www.w3.org/2001/XMLSchema-instance" xmlns:pc="http://schemas.microsoft.com/office/infopath/2007/PartnerControls">
-  <documentManagement/>
-</p:properties>
-</file>
-
-<file path=customXml/item2.xml><?xml version="1.0" encoding="utf-8"?>
 <ct:contentTypeSchema xmlns:ct="http://schemas.microsoft.com/office/2006/metadata/contentType" xmlns:ma="http://schemas.microsoft.com/office/2006/metadata/properties/metaAttributes" ct:_="" ma:_="" ma:contentTypeName="Document" ma:contentTypeID="0x010100843B1CA7137EAA4AA4D2E2BDF81DB089" ma:contentTypeVersion="6" ma:contentTypeDescription="Create a new document." ma:contentTypeScope="" ma:versionID="bc1e24afe28d0c357cbe371dee75991f">
   <xsd:schema xmlns:xsd="http://www.w3.org/2001/XMLSchema" xmlns:xs="http://www.w3.org/2001/XMLSchema" xmlns:p="http://schemas.microsoft.com/office/2006/metadata/properties" xmlns:ns2="5a3927fa-f9bf-4e21-9816-7f925d835449" xmlns:ns3="8424d317-e79a-4f10-a77e-d0bbf29883f4" targetNamespace="http://schemas.microsoft.com/office/2006/metadata/properties" ma:root="true" ma:fieldsID="295e7143f0b6c41d02b0e37cafda85bc" ns2:_="" ns3:_="">
     <xsd:import namespace="5a3927fa-f9bf-4e21-9816-7f925d835449"/>
@@ -7370,6 +7586,12 @@
 </ct:contentTypeSchema>
 </file>
 
+<file path=customXml/item2.xml><?xml version="1.0" encoding="utf-8"?>
+<p:properties xmlns:p="http://schemas.microsoft.com/office/2006/metadata/properties" xmlns:xsi="http://www.w3.org/2001/XMLSchema-instance" xmlns:pc="http://schemas.microsoft.com/office/infopath/2007/PartnerControls">
+  <documentManagement/>
+</p:properties>
+</file>
+
 <file path=customXml/item3.xml><?xml version="1.0" encoding="utf-8"?>
 <?mso-contentType ?>
 <FormTemplates xmlns="http://schemas.microsoft.com/sharepoint/v3/contenttype/forms">
@@ -7380,23 +7602,6 @@
 </file>
 
 <file path=customXml/itemProps1.xml><?xml version="1.0" encoding="utf-8"?>
-<ds:datastoreItem xmlns:ds="http://schemas.openxmlformats.org/officeDocument/2006/customXml" ds:itemID="{EBB40029-5245-4DBF-95C2-47B86CF70C9F}">
-  <ds:schemaRefs>
-    <ds:schemaRef ds:uri="http://schemas.openxmlformats.org/package/2006/metadata/core-properties"/>
-    <ds:schemaRef ds:uri="http://purl.org/dc/elements/1.1/"/>
-    <ds:schemaRef ds:uri="http://schemas.microsoft.com/office/2006/metadata/properties"/>
-    <ds:schemaRef ds:uri="http://purl.org/dc/dcmitype/"/>
-    <ds:schemaRef ds:uri="http://schemas.microsoft.com/office/2006/documentManagement/types"/>
-    <ds:schemaRef ds:uri="http://www.w3.org/XML/1998/namespace"/>
-    <ds:schemaRef ds:uri="http://schemas.microsoft.com/office/infopath/2007/PartnerControls"/>
-    <ds:schemaRef ds:uri="http://purl.org/dc/terms/"/>
-    <ds:schemaRef ds:uri="8424d317-e79a-4f10-a77e-d0bbf29883f4"/>
-    <ds:schemaRef ds:uri="5a3927fa-f9bf-4e21-9816-7f925d835449"/>
-  </ds:schemaRefs>
-</ds:datastoreItem>
-</file>
-
-<file path=customXml/itemProps2.xml><?xml version="1.0" encoding="utf-8"?>
 <ds:datastoreItem xmlns:ds="http://schemas.openxmlformats.org/officeDocument/2006/customXml" ds:itemID="{36E21A90-015C-4668-BFC7-DAC0854978F4}">
   <ds:schemaRefs>
     <ds:schemaRef ds:uri="http://schemas.microsoft.com/office/2006/metadata/contentType"/>
@@ -7415,6 +7620,23 @@
 </ds:datastoreItem>
 </file>
 
+<file path=customXml/itemProps2.xml><?xml version="1.0" encoding="utf-8"?>
+<ds:datastoreItem xmlns:ds="http://schemas.openxmlformats.org/officeDocument/2006/customXml" ds:itemID="{EBB40029-5245-4DBF-95C2-47B86CF70C9F}">
+  <ds:schemaRefs>
+    <ds:schemaRef ds:uri="http://schemas.openxmlformats.org/package/2006/metadata/core-properties"/>
+    <ds:schemaRef ds:uri="http://purl.org/dc/elements/1.1/"/>
+    <ds:schemaRef ds:uri="http://schemas.microsoft.com/office/2006/metadata/properties"/>
+    <ds:schemaRef ds:uri="http://purl.org/dc/dcmitype/"/>
+    <ds:schemaRef ds:uri="http://schemas.microsoft.com/office/2006/documentManagement/types"/>
+    <ds:schemaRef ds:uri="http://www.w3.org/XML/1998/namespace"/>
+    <ds:schemaRef ds:uri="http://schemas.microsoft.com/office/infopath/2007/PartnerControls"/>
+    <ds:schemaRef ds:uri="http://purl.org/dc/terms/"/>
+    <ds:schemaRef ds:uri="8424d317-e79a-4f10-a77e-d0bbf29883f4"/>
+    <ds:schemaRef ds:uri="5a3927fa-f9bf-4e21-9816-7f925d835449"/>
+  </ds:schemaRefs>
+</ds:datastoreItem>
+</file>
+
 <file path=customXml/itemProps3.xml><?xml version="1.0" encoding="utf-8"?>
 <ds:datastoreItem xmlns:ds="http://schemas.openxmlformats.org/officeDocument/2006/customXml" ds:itemID="{8ADF127F-DA0B-482F-97E0-90B52A503C8D}">
   <ds:schemaRefs>

</xml_diff>